<commit_message>
Added main menu and divided code in to functions
</commit_message>
<xml_diff>
--- a/TextureMaking/Textures.pptx
+++ b/TextureMaking/Textures.pptx
@@ -7,6 +7,7 @@
   <p:sldIdLst>
     <p:sldId id="256" r:id="rId2"/>
     <p:sldId id="257" r:id="rId3"/>
+    <p:sldId id="258" r:id="rId4"/>
   </p:sldIdLst>
   <p:sldSz cx="12192000" cy="6858000"/>
   <p:notesSz cx="6858000" cy="9144000"/>
@@ -2607,7 +2608,7 @@
           <a:p>
             <a:fld id="{CC26427F-B79D-40DC-917E-BD366897C68B}" type="datetimeFigureOut">
               <a:rPr lang="en-PK" smtClean="0"/>
-              <a:t>04/12/2022</a:t>
+              <a:t>12/29/2022</a:t>
             </a:fld>
             <a:endParaRPr lang="en-PK"/>
           </a:p>
@@ -2807,7 +2808,7 @@
           <a:p>
             <a:fld id="{CC26427F-B79D-40DC-917E-BD366897C68B}" type="datetimeFigureOut">
               <a:rPr lang="en-PK" smtClean="0"/>
-              <a:t>04/12/2022</a:t>
+              <a:t>12/29/2022</a:t>
             </a:fld>
             <a:endParaRPr lang="en-PK"/>
           </a:p>
@@ -3017,7 +3018,7 @@
           <a:p>
             <a:fld id="{CC26427F-B79D-40DC-917E-BD366897C68B}" type="datetimeFigureOut">
               <a:rPr lang="en-PK" smtClean="0"/>
-              <a:t>04/12/2022</a:t>
+              <a:t>12/29/2022</a:t>
             </a:fld>
             <a:endParaRPr lang="en-PK"/>
           </a:p>
@@ -3217,7 +3218,7 @@
           <a:p>
             <a:fld id="{CC26427F-B79D-40DC-917E-BD366897C68B}" type="datetimeFigureOut">
               <a:rPr lang="en-PK" smtClean="0"/>
-              <a:t>04/12/2022</a:t>
+              <a:t>12/29/2022</a:t>
             </a:fld>
             <a:endParaRPr lang="en-PK"/>
           </a:p>
@@ -3493,7 +3494,7 @@
           <a:p>
             <a:fld id="{CC26427F-B79D-40DC-917E-BD366897C68B}" type="datetimeFigureOut">
               <a:rPr lang="en-PK" smtClean="0"/>
-              <a:t>04/12/2022</a:t>
+              <a:t>12/29/2022</a:t>
             </a:fld>
             <a:endParaRPr lang="en-PK"/>
           </a:p>
@@ -3761,7 +3762,7 @@
           <a:p>
             <a:fld id="{CC26427F-B79D-40DC-917E-BD366897C68B}" type="datetimeFigureOut">
               <a:rPr lang="en-PK" smtClean="0"/>
-              <a:t>04/12/2022</a:t>
+              <a:t>12/29/2022</a:t>
             </a:fld>
             <a:endParaRPr lang="en-PK"/>
           </a:p>
@@ -4176,7 +4177,7 @@
           <a:p>
             <a:fld id="{CC26427F-B79D-40DC-917E-BD366897C68B}" type="datetimeFigureOut">
               <a:rPr lang="en-PK" smtClean="0"/>
-              <a:t>04/12/2022</a:t>
+              <a:t>12/29/2022</a:t>
             </a:fld>
             <a:endParaRPr lang="en-PK"/>
           </a:p>
@@ -4318,7 +4319,7 @@
           <a:p>
             <a:fld id="{CC26427F-B79D-40DC-917E-BD366897C68B}" type="datetimeFigureOut">
               <a:rPr lang="en-PK" smtClean="0"/>
-              <a:t>04/12/2022</a:t>
+              <a:t>12/29/2022</a:t>
             </a:fld>
             <a:endParaRPr lang="en-PK"/>
           </a:p>
@@ -4431,7 +4432,7 @@
           <a:p>
             <a:fld id="{CC26427F-B79D-40DC-917E-BD366897C68B}" type="datetimeFigureOut">
               <a:rPr lang="en-PK" smtClean="0"/>
-              <a:t>04/12/2022</a:t>
+              <a:t>12/29/2022</a:t>
             </a:fld>
             <a:endParaRPr lang="en-PK"/>
           </a:p>
@@ -4744,7 +4745,7 @@
           <a:p>
             <a:fld id="{CC26427F-B79D-40DC-917E-BD366897C68B}" type="datetimeFigureOut">
               <a:rPr lang="en-PK" smtClean="0"/>
-              <a:t>04/12/2022</a:t>
+              <a:t>12/29/2022</a:t>
             </a:fld>
             <a:endParaRPr lang="en-PK"/>
           </a:p>
@@ -5033,7 +5034,7 @@
           <a:p>
             <a:fld id="{CC26427F-B79D-40DC-917E-BD366897C68B}" type="datetimeFigureOut">
               <a:rPr lang="en-PK" smtClean="0"/>
-              <a:t>04/12/2022</a:t>
+              <a:t>12/29/2022</a:t>
             </a:fld>
             <a:endParaRPr lang="en-PK"/>
           </a:p>
@@ -5276,7 +5277,7 @@
           <a:p>
             <a:fld id="{CC26427F-B79D-40DC-917E-BD366897C68B}" type="datetimeFigureOut">
               <a:rPr lang="en-PK" smtClean="0"/>
-              <a:t>04/12/2022</a:t>
+              <a:t>12/29/2022</a:t>
             </a:fld>
             <a:endParaRPr lang="en-PK"/>
           </a:p>
@@ -6206,6 +6207,87 @@
 </p:sld>
 </file>
 
+<file path=ppt/slides/slide3.xml><?xml version="1.0" encoding="utf-8"?>
+<p:sld xmlns:a="http://schemas.openxmlformats.org/drawingml/2006/main" xmlns:r="http://schemas.openxmlformats.org/officeDocument/2006/relationships" xmlns:p="http://schemas.openxmlformats.org/presentationml/2006/main">
+  <p:cSld>
+    <p:spTree>
+      <p:nvGrpSpPr>
+        <p:cNvPr id="1" name=""/>
+        <p:cNvGrpSpPr/>
+        <p:nvPr/>
+      </p:nvGrpSpPr>
+      <p:grpSpPr>
+        <a:xfrm>
+          <a:off x="0" y="0"/>
+          <a:ext cx="0" cy="0"/>
+          <a:chOff x="0" y="0"/>
+          <a:chExt cx="0" cy="0"/>
+        </a:xfrm>
+      </p:grpSpPr>
+      <p:sp>
+        <p:nvSpPr>
+          <p:cNvPr id="2" name="Title 1">
+            <a:extLst>
+              <a:ext uri="{FF2B5EF4-FFF2-40B4-BE49-F238E27FC236}">
+                <a16:creationId xmlns:a16="http://schemas.microsoft.com/office/drawing/2014/main" id="{CA765B8A-5AAC-6ED3-BCB5-CB1885C255F0}"/>
+              </a:ext>
+            </a:extLst>
+          </p:cNvPr>
+          <p:cNvSpPr>
+            <a:spLocks noGrp="1"/>
+          </p:cNvSpPr>
+          <p:nvPr>
+            <p:ph type="title"/>
+          </p:nvPr>
+        </p:nvSpPr>
+        <p:spPr>
+          <a:xfrm>
+            <a:off x="1899249" y="1762604"/>
+            <a:ext cx="10515600" cy="2774890"/>
+          </a:xfrm>
+        </p:spPr>
+        <p:txBody>
+          <a:bodyPr>
+            <a:normAutofit/>
+          </a:bodyPr>
+          <a:lstStyle/>
+          <a:p>
+            <a:r>
+              <a:rPr lang="en-GB" sz="5400" dirty="0">
+                <a:latin typeface="HelloHeadlineW00-Regular" panose="03080000000000000000" pitchFamily="66" charset="0"/>
+              </a:rPr>
+              <a:t>Aperture Science Maze</a:t>
+            </a:r>
+            <a:br>
+              <a:rPr lang="en-GB" sz="5400" dirty="0">
+                <a:latin typeface="HelloHeadlineW00-Regular" panose="03080000000000000000" pitchFamily="66" charset="0"/>
+              </a:rPr>
+            </a:br>
+            <a:r>
+              <a:rPr lang="en-GB" sz="5400" dirty="0">
+                <a:latin typeface="HelloHeadlineW00-Regular" panose="03080000000000000000" pitchFamily="66" charset="0"/>
+              </a:rPr>
+              <a:t>Testing Initiative</a:t>
+            </a:r>
+            <a:endParaRPr lang="en-US" sz="5400" dirty="0">
+              <a:latin typeface="HelloHeadlineW00-Regular" panose="03080000000000000000" pitchFamily="66" charset="0"/>
+            </a:endParaRPr>
+          </a:p>
+        </p:txBody>
+      </p:sp>
+    </p:spTree>
+    <p:extLst>
+      <p:ext uri="{BB962C8B-B14F-4D97-AF65-F5344CB8AC3E}">
+        <p14:creationId xmlns:p14="http://schemas.microsoft.com/office/powerpoint/2010/main" val="1897621719"/>
+      </p:ext>
+    </p:extLst>
+  </p:cSld>
+  <p:clrMapOvr>
+    <a:masterClrMapping/>
+  </p:clrMapOvr>
+</p:sld>
+</file>
+
 <file path=ppt/theme/theme1.xml><?xml version="1.0" encoding="utf-8"?>
 <a:theme xmlns:a="http://schemas.openxmlformats.org/drawingml/2006/main" name="Office Theme">
   <a:themeElements>

</xml_diff>